<commit_message>
changed the front end and ordered clusters by cluster size
</commit_message>
<xml_diff>
--- a/presentations/Milinda_Lakkam_Week3Demo.pptx
+++ b/presentations/Milinda_Lakkam_Week3Demo.pptx
@@ -8,8 +8,8 @@
     <p:sldId id="256" r:id="rId2"/>
     <p:sldId id="257" r:id="rId3"/>
     <p:sldId id="264" r:id="rId4"/>
-    <p:sldId id="262" r:id="rId5"/>
-    <p:sldId id="266" r:id="rId6"/>
+    <p:sldId id="266" r:id="rId5"/>
+    <p:sldId id="262" r:id="rId6"/>
     <p:sldId id="265" r:id="rId7"/>
   </p:sldIdLst>
   <p:sldSz cx="9144000" cy="6858000" type="screen4x3"/>
@@ -3404,14 +3404,47 @@
                 <a:solidFill>
                   <a:schemeClr val="tx1"/>
                 </a:solidFill>
+                <a:latin typeface="News Gothic MT"/>
+                <a:cs typeface="News Gothic MT"/>
               </a:rPr>
-              <a:t>Capture the conversation</a:t>
+              <a:t>Talking Points</a:t>
             </a:r>
             <a:endParaRPr lang="en-US" dirty="0">
               <a:solidFill>
                 <a:schemeClr val="tx1"/>
               </a:solidFill>
+              <a:latin typeface="News Gothic MT"/>
+              <a:cs typeface="News Gothic MT"/>
             </a:endParaRPr>
+          </a:p>
+        </p:txBody>
+      </p:sp>
+      <p:sp>
+        <p:nvSpPr>
+          <p:cNvPr id="3" name="TextBox 2"/>
+          <p:cNvSpPr txBox="1"/>
+          <p:nvPr/>
+        </p:nvSpPr>
+        <p:spPr>
+          <a:xfrm>
+            <a:off x="727241" y="3689684"/>
+            <a:ext cx="7820527" cy="584776"/>
+          </a:xfrm>
+          <a:prstGeom prst="rect">
+            <a:avLst/>
+          </a:prstGeom>
+          <a:noFill/>
+        </p:spPr>
+        <p:txBody>
+          <a:bodyPr wrap="square" rtlCol="0">
+            <a:spAutoFit/>
+          </a:bodyPr>
+          <a:lstStyle/>
+          <a:p>
+            <a:r>
+              <a:rPr lang="en-US" sz="3200" dirty="0" smtClean="0"/>
+              <a:t>Capturing the conversation</a:t>
+            </a:r>
           </a:p>
         </p:txBody>
       </p:sp>
@@ -3474,6 +3507,8 @@
                 <a:solidFill>
                   <a:srgbClr val="000000"/>
                 </a:solidFill>
+                <a:latin typeface="News Gothic MT"/>
+                <a:cs typeface="News Gothic MT"/>
               </a:rPr>
               <a:t>Capture </a:t>
             </a:r>
@@ -3482,53 +3517,11 @@
                 <a:solidFill>
                   <a:srgbClr val="000000"/>
                 </a:solidFill>
+                <a:latin typeface="News Gothic MT"/>
+                <a:cs typeface="News Gothic MT"/>
               </a:rPr>
               <a:t>the conversation</a:t>
             </a:r>
-          </a:p>
-        </p:txBody>
-      </p:sp>
-      <p:sp>
-        <p:nvSpPr>
-          <p:cNvPr id="7" name="TextBox 6"/>
-          <p:cNvSpPr txBox="1"/>
-          <p:nvPr/>
-        </p:nvSpPr>
-        <p:spPr>
-          <a:xfrm>
-            <a:off x="711199" y="5087818"/>
-            <a:ext cx="7305676" cy="1015663"/>
-          </a:xfrm>
-          <a:prstGeom prst="rect">
-            <a:avLst/>
-          </a:prstGeom>
-          <a:noFill/>
-        </p:spPr>
-        <p:txBody>
-          <a:bodyPr wrap="square" rtlCol="0">
-            <a:spAutoFit/>
-          </a:bodyPr>
-          <a:lstStyle/>
-          <a:p>
-            <a:pPr marL="285750" indent="-285750">
-              <a:buFont typeface="Arial"/>
-              <a:buChar char="•"/>
-            </a:pPr>
-            <a:r>
-              <a:rPr lang="en-US" sz="2000" dirty="0" smtClean="0"/>
-              <a:t>Comments on the NYT articles have diverse viewpoints. </a:t>
-            </a:r>
-          </a:p>
-          <a:p>
-            <a:pPr marL="285750" indent="-285750">
-              <a:buFont typeface="Arial"/>
-              <a:buChar char="•"/>
-            </a:pPr>
-            <a:r>
-              <a:rPr lang="en-US" sz="2000" dirty="0" smtClean="0"/>
-              <a:t>Can I curate the comments to get the representative set that cover the entire spectrum?</a:t>
-            </a:r>
-            <a:endParaRPr lang="en-US" sz="2000" dirty="0"/>
           </a:p>
         </p:txBody>
       </p:sp>
@@ -3554,7 +3547,7 @@
         </p:blipFill>
         <p:spPr>
           <a:xfrm>
-            <a:off x="587374" y="1410622"/>
+            <a:off x="587374" y="1524000"/>
             <a:ext cx="7794625" cy="1114900"/>
           </a:xfrm>
           <a:prstGeom prst="rect">
@@ -3570,8 +3563,8 @@
         </p:nvSpPr>
         <p:spPr>
           <a:xfrm>
-            <a:off x="711199" y="3210868"/>
-            <a:ext cx="7670799" cy="954107"/>
+            <a:off x="711200" y="3841810"/>
+            <a:ext cx="7670799" cy="1261884"/>
           </a:xfrm>
           <a:prstGeom prst="rect">
             <a:avLst/>
@@ -3584,25 +3577,40 @@
           <a:lstStyle/>
           <a:p>
             <a:r>
-              <a:rPr lang="en-US" sz="2000" dirty="0" smtClean="0"/>
+              <a:rPr lang="en-US" sz="2000" dirty="0" smtClean="0">
+                <a:latin typeface="News Gothic MT"/>
+                <a:cs typeface="News Gothic MT"/>
+              </a:rPr>
               <a:t>“ Dip </a:t>
             </a:r>
             <a:r>
-              <a:rPr lang="en-US" sz="2000" dirty="0"/>
+              <a:rPr lang="en-US" sz="2000" dirty="0">
+                <a:latin typeface="News Gothic MT"/>
+                <a:cs typeface="News Gothic MT"/>
+              </a:rPr>
               <a:t>into the comments, the American text genre of the moment, and you can sense the currents that move American </a:t>
             </a:r>
             <a:r>
-              <a:rPr lang="en-US" sz="2000" dirty="0" smtClean="0"/>
+              <a:rPr lang="en-US" sz="2000" dirty="0" smtClean="0">
+                <a:latin typeface="News Gothic MT"/>
+                <a:cs typeface="News Gothic MT"/>
+              </a:rPr>
               <a:t>life.”</a:t>
             </a:r>
           </a:p>
           <a:p>
             <a:pPr algn="r"/>
             <a:r>
-              <a:rPr lang="en-US" sz="1600" i="1" dirty="0" smtClean="0"/>
+              <a:rPr lang="en-US" sz="1600" i="1" dirty="0" smtClean="0">
+                <a:latin typeface="News Gothic MT"/>
+                <a:cs typeface="News Gothic MT"/>
+              </a:rPr>
               <a:t>- Michael Erard in his article ‘No comments’</a:t>
             </a:r>
-            <a:endParaRPr lang="en-US" sz="1600" i="1" dirty="0"/>
+            <a:endParaRPr lang="en-US" sz="1600" i="1" dirty="0">
+              <a:latin typeface="News Gothic MT"/>
+              <a:cs typeface="News Gothic MT"/>
+            </a:endParaRPr>
           </a:p>
         </p:txBody>
       </p:sp>
@@ -3663,6 +3671,8 @@
                 <a:solidFill>
                   <a:srgbClr val="000000"/>
                 </a:solidFill>
+                <a:latin typeface="News Gothic MT"/>
+                <a:cs typeface="News Gothic MT"/>
               </a:rPr>
               <a:t>Algorithm</a:t>
             </a:r>
@@ -3670,6 +3680,8 @@
               <a:solidFill>
                 <a:srgbClr val="000000"/>
               </a:solidFill>
+              <a:latin typeface="News Gothic MT"/>
+              <a:cs typeface="News Gothic MT"/>
             </a:endParaRPr>
           </a:p>
         </p:txBody>
@@ -5093,6 +5105,152 @@
           <a:chExt cx="0" cy="0"/>
         </a:xfrm>
       </p:grpSpPr>
+      <p:sp>
+        <p:nvSpPr>
+          <p:cNvPr id="2" name="Title 1"/>
+          <p:cNvSpPr>
+            <a:spLocks noGrp="1"/>
+          </p:cNvSpPr>
+          <p:nvPr>
+            <p:ph type="title"/>
+          </p:nvPr>
+        </p:nvSpPr>
+        <p:spPr/>
+        <p:txBody>
+          <a:bodyPr>
+            <a:normAutofit/>
+          </a:bodyPr>
+          <a:lstStyle/>
+          <a:p>
+            <a:r>
+              <a:rPr lang="en-US" sz="3600" dirty="0" smtClean="0">
+                <a:solidFill>
+                  <a:srgbClr val="000000"/>
+                </a:solidFill>
+                <a:latin typeface="News Gothic MT"/>
+                <a:cs typeface="News Gothic MT"/>
+              </a:rPr>
+              <a:t>K-means clustering </a:t>
+            </a:r>
+            <a:endParaRPr lang="en-US" sz="3600" dirty="0">
+              <a:solidFill>
+                <a:srgbClr val="000000"/>
+              </a:solidFill>
+              <a:latin typeface="News Gothic MT"/>
+              <a:cs typeface="News Gothic MT"/>
+            </a:endParaRPr>
+          </a:p>
+        </p:txBody>
+      </p:sp>
+      <p:sp>
+        <p:nvSpPr>
+          <p:cNvPr id="3" name="Content Placeholder 2"/>
+          <p:cNvSpPr>
+            <a:spLocks noGrp="1"/>
+          </p:cNvSpPr>
+          <p:nvPr>
+            <p:ph idx="1"/>
+          </p:nvPr>
+        </p:nvSpPr>
+        <p:spPr>
+          <a:xfrm>
+            <a:off x="457199" y="1600200"/>
+            <a:ext cx="8229601" cy="4591050"/>
+          </a:xfrm>
+        </p:spPr>
+        <p:txBody>
+          <a:bodyPr>
+            <a:normAutofit/>
+          </a:bodyPr>
+          <a:lstStyle/>
+          <a:p>
+            <a:pPr marL="0" indent="0">
+              <a:buNone/>
+            </a:pPr>
+            <a:endParaRPr lang="en-US" dirty="0" smtClean="0"/>
+          </a:p>
+          <a:p>
+            <a:pPr marL="0" indent="0">
+              <a:buNone/>
+            </a:pPr>
+            <a:r>
+              <a:rPr lang="en-US" dirty="0"/>
+              <a:t>	 </a:t>
+            </a:r>
+            <a:r>
+              <a:rPr lang="en-US" dirty="0" smtClean="0"/>
+              <a:t> </a:t>
+            </a:r>
+          </a:p>
+        </p:txBody>
+      </p:sp>
+      <p:pic>
+        <p:nvPicPr>
+          <p:cNvPr id="4" name="Picture 3" descr="TSNEclusters.png"/>
+          <p:cNvPicPr>
+            <a:picLocks noChangeAspect="1"/>
+          </p:cNvPicPr>
+          <p:nvPr/>
+        </p:nvPicPr>
+        <p:blipFill>
+          <a:blip r:embed="rId2">
+            <a:extLst>
+              <a:ext uri="{28A0092B-C50C-407E-A947-70E740481C1C}">
+                <a14:useLocalDpi xmlns:a14="http://schemas.microsoft.com/office/drawing/2010/main" val="0"/>
+              </a:ext>
+            </a:extLst>
+          </a:blip>
+          <a:stretch>
+            <a:fillRect/>
+          </a:stretch>
+        </p:blipFill>
+        <p:spPr>
+          <a:xfrm>
+            <a:off x="1380958" y="1720516"/>
+            <a:ext cx="6248400" cy="4356100"/>
+          </a:xfrm>
+          <a:prstGeom prst="rect">
+            <a:avLst/>
+          </a:prstGeom>
+        </p:spPr>
+      </p:pic>
+    </p:spTree>
+    <p:extLst>
+      <p:ext uri="{BB962C8B-B14F-4D97-AF65-F5344CB8AC3E}">
+        <p14:creationId xmlns:p14="http://schemas.microsoft.com/office/powerpoint/2010/main" val="3776467693"/>
+      </p:ext>
+    </p:extLst>
+  </p:cSld>
+  <p:clrMapOvr>
+    <a:masterClrMapping/>
+  </p:clrMapOvr>
+  <p:timing>
+    <p:tnLst>
+      <p:par>
+        <p:cTn xmlns:p14="http://schemas.microsoft.com/office/powerpoint/2010/main" id="1" dur="indefinite" restart="never" nodeType="tmRoot"/>
+      </p:par>
+    </p:tnLst>
+  </p:timing>
+</p:sld>
+</file>
+
+<file path=ppt/slides/slide5.xml><?xml version="1.0" encoding="utf-8"?>
+<p:sld xmlns:a="http://schemas.openxmlformats.org/drawingml/2006/main" xmlns:r="http://schemas.openxmlformats.org/officeDocument/2006/relationships" xmlns:p="http://schemas.openxmlformats.org/presentationml/2006/main">
+  <p:cSld>
+    <p:spTree>
+      <p:nvGrpSpPr>
+        <p:cNvPr id="1" name=""/>
+        <p:cNvGrpSpPr/>
+        <p:nvPr/>
+      </p:nvGrpSpPr>
+      <p:grpSpPr>
+        <a:xfrm>
+          <a:off x="0" y="0"/>
+          <a:ext cx="0" cy="0"/>
+          <a:chOff x="0" y="0"/>
+          <a:chExt cx="0" cy="0"/>
+        </a:xfrm>
+      </p:grpSpPr>
       <p:grpSp>
         <p:nvGrpSpPr>
           <p:cNvPr id="13" name="Group 12"/>
@@ -5230,6 +5388,8 @@
                 <a:solidFill>
                   <a:srgbClr val="000000"/>
                 </a:solidFill>
+                <a:latin typeface="News Gothic MT"/>
+                <a:cs typeface="News Gothic MT"/>
               </a:rPr>
               <a:t>A Toxic Work World </a:t>
             </a:r>
@@ -5238,6 +5398,8 @@
                 <a:solidFill>
                   <a:srgbClr val="000000"/>
                 </a:solidFill>
+                <a:latin typeface="News Gothic MT"/>
+                <a:cs typeface="News Gothic MT"/>
               </a:rPr>
               <a:t>by ANNE-MARIE SLAUGHTER    Sept. 18 2015</a:t>
             </a:r>
@@ -5245,6 +5407,8 @@
               <a:solidFill>
                 <a:srgbClr val="000000"/>
               </a:solidFill>
+              <a:latin typeface="News Gothic MT"/>
+              <a:cs typeface="News Gothic MT"/>
             </a:endParaRPr>
           </a:p>
         </p:txBody>
@@ -5511,148 +5675,6 @@
 </p:sld>
 </file>
 
-<file path=ppt/slides/slide5.xml><?xml version="1.0" encoding="utf-8"?>
-<p:sld xmlns:a="http://schemas.openxmlformats.org/drawingml/2006/main" xmlns:r="http://schemas.openxmlformats.org/officeDocument/2006/relationships" xmlns:p="http://schemas.openxmlformats.org/presentationml/2006/main">
-  <p:cSld>
-    <p:spTree>
-      <p:nvGrpSpPr>
-        <p:cNvPr id="1" name=""/>
-        <p:cNvGrpSpPr/>
-        <p:nvPr/>
-      </p:nvGrpSpPr>
-      <p:grpSpPr>
-        <a:xfrm>
-          <a:off x="0" y="0"/>
-          <a:ext cx="0" cy="0"/>
-          <a:chOff x="0" y="0"/>
-          <a:chExt cx="0" cy="0"/>
-        </a:xfrm>
-      </p:grpSpPr>
-      <p:sp>
-        <p:nvSpPr>
-          <p:cNvPr id="2" name="Title 1"/>
-          <p:cNvSpPr>
-            <a:spLocks noGrp="1"/>
-          </p:cNvSpPr>
-          <p:nvPr>
-            <p:ph type="title"/>
-          </p:nvPr>
-        </p:nvSpPr>
-        <p:spPr/>
-        <p:txBody>
-          <a:bodyPr>
-            <a:normAutofit/>
-          </a:bodyPr>
-          <a:lstStyle/>
-          <a:p>
-            <a:r>
-              <a:rPr lang="en-US" sz="3600" dirty="0" smtClean="0">
-                <a:solidFill>
-                  <a:srgbClr val="000000"/>
-                </a:solidFill>
-              </a:rPr>
-              <a:t>Projection of the comments in  2D space</a:t>
-            </a:r>
-            <a:endParaRPr lang="en-US" sz="3600" dirty="0">
-              <a:solidFill>
-                <a:srgbClr val="000000"/>
-              </a:solidFill>
-            </a:endParaRPr>
-          </a:p>
-        </p:txBody>
-      </p:sp>
-      <p:sp>
-        <p:nvSpPr>
-          <p:cNvPr id="3" name="Content Placeholder 2"/>
-          <p:cNvSpPr>
-            <a:spLocks noGrp="1"/>
-          </p:cNvSpPr>
-          <p:nvPr>
-            <p:ph idx="1"/>
-          </p:nvPr>
-        </p:nvSpPr>
-        <p:spPr>
-          <a:xfrm>
-            <a:off x="457199" y="1600200"/>
-            <a:ext cx="8229601" cy="4591050"/>
-          </a:xfrm>
-        </p:spPr>
-        <p:txBody>
-          <a:bodyPr>
-            <a:normAutofit/>
-          </a:bodyPr>
-          <a:lstStyle/>
-          <a:p>
-            <a:pPr marL="0" indent="0">
-              <a:buNone/>
-            </a:pPr>
-            <a:endParaRPr lang="en-US" dirty="0" smtClean="0"/>
-          </a:p>
-          <a:p>
-            <a:pPr marL="0" indent="0">
-              <a:buNone/>
-            </a:pPr>
-            <a:r>
-              <a:rPr lang="en-US" dirty="0"/>
-              <a:t>	 </a:t>
-            </a:r>
-            <a:r>
-              <a:rPr lang="en-US" dirty="0" smtClean="0"/>
-              <a:t> </a:t>
-            </a:r>
-          </a:p>
-        </p:txBody>
-      </p:sp>
-      <p:pic>
-        <p:nvPicPr>
-          <p:cNvPr id="4" name="Picture 3" descr="TSNEclusters.png"/>
-          <p:cNvPicPr>
-            <a:picLocks noChangeAspect="1"/>
-          </p:cNvPicPr>
-          <p:nvPr/>
-        </p:nvPicPr>
-        <p:blipFill>
-          <a:blip r:embed="rId2">
-            <a:extLst>
-              <a:ext uri="{28A0092B-C50C-407E-A947-70E740481C1C}">
-                <a14:useLocalDpi xmlns:a14="http://schemas.microsoft.com/office/drawing/2010/main" val="0"/>
-              </a:ext>
-            </a:extLst>
-          </a:blip>
-          <a:stretch>
-            <a:fillRect/>
-          </a:stretch>
-        </p:blipFill>
-        <p:spPr>
-          <a:xfrm>
-            <a:off x="1380958" y="1720516"/>
-            <a:ext cx="6248400" cy="4356100"/>
-          </a:xfrm>
-          <a:prstGeom prst="rect">
-            <a:avLst/>
-          </a:prstGeom>
-        </p:spPr>
-      </p:pic>
-    </p:spTree>
-    <p:extLst>
-      <p:ext uri="{BB962C8B-B14F-4D97-AF65-F5344CB8AC3E}">
-        <p14:creationId xmlns:p14="http://schemas.microsoft.com/office/powerpoint/2010/main" val="3776467693"/>
-      </p:ext>
-    </p:extLst>
-  </p:cSld>
-  <p:clrMapOvr>
-    <a:masterClrMapping/>
-  </p:clrMapOvr>
-  <p:timing>
-    <p:tnLst>
-      <p:par>
-        <p:cTn xmlns:p14="http://schemas.microsoft.com/office/powerpoint/2010/main" id="1" dur="indefinite" restart="never" nodeType="tmRoot"/>
-      </p:par>
-    </p:tnLst>
-  </p:timing>
-</p:sld>
-</file>
-
 <file path=ppt/slides/slide6.xml><?xml version="1.0" encoding="utf-8"?>
 <p:sld xmlns:a="http://schemas.openxmlformats.org/drawingml/2006/main" xmlns:r="http://schemas.openxmlformats.org/officeDocument/2006/relationships" xmlns:p="http://schemas.openxmlformats.org/presentationml/2006/main">
   <p:cSld>
@@ -5697,6 +5719,8 @@
                 <a:solidFill>
                   <a:srgbClr val="000000"/>
                 </a:solidFill>
+                <a:latin typeface="News Gothic MT"/>
+                <a:cs typeface="News Gothic MT"/>
               </a:rPr>
               <a:t>Milinda Lakkam</a:t>
             </a:r>
@@ -5704,6 +5728,8 @@
               <a:solidFill>
                 <a:srgbClr val="000000"/>
               </a:solidFill>
+              <a:latin typeface="News Gothic MT"/>
+              <a:cs typeface="News Gothic MT"/>
             </a:endParaRPr>
           </a:p>
         </p:txBody>
@@ -5772,8 +5798,8 @@
         </p:blipFill>
         <p:spPr>
           <a:xfrm>
-            <a:off x="3418901" y="307474"/>
-            <a:ext cx="5725099" cy="4280115"/>
+            <a:off x="4300854" y="277222"/>
+            <a:ext cx="4843145" cy="3620761"/>
           </a:xfrm>
           <a:prstGeom prst="rect">
             <a:avLst/>
@@ -5802,8 +5828,8 @@
         </p:blipFill>
         <p:spPr>
           <a:xfrm>
-            <a:off x="3418901" y="2970497"/>
-            <a:ext cx="5725099" cy="3887503"/>
+            <a:off x="4300854" y="3569368"/>
+            <a:ext cx="4843146" cy="3288632"/>
           </a:xfrm>
           <a:prstGeom prst="rect">
             <a:avLst/>
@@ -5832,7 +5858,7 @@
         </p:blipFill>
         <p:spPr>
           <a:xfrm>
-            <a:off x="-39113" y="1600200"/>
+            <a:off x="147053" y="1600200"/>
             <a:ext cx="2127605" cy="1180432"/>
           </a:xfrm>
           <a:prstGeom prst="rect">
@@ -5862,7 +5888,7 @@
         </p:blipFill>
         <p:spPr>
           <a:xfrm>
-            <a:off x="2120663" y="1711158"/>
+            <a:off x="2240979" y="1711158"/>
             <a:ext cx="718553" cy="1069474"/>
           </a:xfrm>
           <a:prstGeom prst="rect">
@@ -5892,7 +5918,7 @@
         </p:blipFill>
         <p:spPr>
           <a:xfrm>
-            <a:off x="2949742" y="1615359"/>
+            <a:off x="3135581" y="1615359"/>
             <a:ext cx="1165273" cy="1165273"/>
           </a:xfrm>
           <a:prstGeom prst="rect">
@@ -5922,8 +5948,8 @@
         </p:blipFill>
         <p:spPr>
           <a:xfrm>
-            <a:off x="574842" y="2839888"/>
-            <a:ext cx="2628478" cy="3952598"/>
+            <a:off x="828842" y="2987602"/>
+            <a:ext cx="2543424" cy="3824697"/>
           </a:xfrm>
           <a:prstGeom prst="rect">
             <a:avLst/>

</xml_diff>